<commit_message>
Labworks for DBC & PBD
</commit_message>
<xml_diff>
--- a/Lectures/Lec08~09-Model-based Testing.pptx
+++ b/Lectures/Lec08~09-Model-based Testing.pptx
@@ -5284,7 +5284,7 @@
           <a:p>
             <a:fld id="{1F6AFFF1-73BC-474B-9B74-714E66F6B952}" type="datetimeFigureOut">
               <a:rPr lang="zh-CN" altLang="en-US" smtClean="0"/>
-              <a:t>2021/5/8</a:t>
+              <a:t>2021/5/10</a:t>
             </a:fld>
             <a:endParaRPr lang="zh-CN" altLang="en-US"/>
           </a:p>
@@ -5486,7 +5486,7 @@
           <a:p>
             <a:fld id="{1F6AFFF1-73BC-474B-9B74-714E66F6B952}" type="datetimeFigureOut">
               <a:rPr lang="zh-CN" altLang="en-US" smtClean="0"/>
-              <a:t>2021/5/8</a:t>
+              <a:t>2021/5/10</a:t>
             </a:fld>
             <a:endParaRPr lang="zh-CN" altLang="en-US"/>
           </a:p>
@@ -5700,7 +5700,7 @@
           <a:p>
             <a:fld id="{1F6AFFF1-73BC-474B-9B74-714E66F6B952}" type="datetimeFigureOut">
               <a:rPr lang="zh-CN" altLang="en-US" smtClean="0"/>
-              <a:t>2021/5/8</a:t>
+              <a:t>2021/5/10</a:t>
             </a:fld>
             <a:endParaRPr lang="zh-CN" altLang="en-US"/>
           </a:p>
@@ -5904,7 +5904,7 @@
           <a:p>
             <a:fld id="{1F6AFFF1-73BC-474B-9B74-714E66F6B952}" type="datetimeFigureOut">
               <a:rPr lang="zh-CN" altLang="en-US" smtClean="0"/>
-              <a:t>2021/5/8</a:t>
+              <a:t>2021/5/10</a:t>
             </a:fld>
             <a:endParaRPr lang="zh-CN" altLang="en-US"/>
           </a:p>
@@ -6131,7 +6131,7 @@
           <a:p>
             <a:fld id="{1F6AFFF1-73BC-474B-9B74-714E66F6B952}" type="datetimeFigureOut">
               <a:rPr lang="zh-CN" altLang="en-US" smtClean="0"/>
-              <a:t>2021/5/8</a:t>
+              <a:t>2021/5/10</a:t>
             </a:fld>
             <a:endParaRPr lang="zh-CN" altLang="en-US"/>
           </a:p>
@@ -6452,7 +6452,7 @@
           <a:p>
             <a:fld id="{1F6AFFF1-73BC-474B-9B74-714E66F6B952}" type="datetimeFigureOut">
               <a:rPr lang="zh-CN" altLang="en-US" smtClean="0"/>
-              <a:t>2021/5/8</a:t>
+              <a:t>2021/5/10</a:t>
             </a:fld>
             <a:endParaRPr lang="zh-CN" altLang="en-US"/>
           </a:p>
@@ -6912,7 +6912,7 @@
           <a:p>
             <a:fld id="{1F6AFFF1-73BC-474B-9B74-714E66F6B952}" type="datetimeFigureOut">
               <a:rPr lang="zh-CN" altLang="en-US" smtClean="0"/>
-              <a:t>2021/5/8</a:t>
+              <a:t>2021/5/10</a:t>
             </a:fld>
             <a:endParaRPr lang="zh-CN" altLang="en-US"/>
           </a:p>
@@ -7068,7 +7068,7 @@
           <a:p>
             <a:fld id="{1F6AFFF1-73BC-474B-9B74-714E66F6B952}" type="datetimeFigureOut">
               <a:rPr lang="zh-CN" altLang="en-US" smtClean="0"/>
-              <a:t>2021/5/8</a:t>
+              <a:t>2021/5/10</a:t>
             </a:fld>
             <a:endParaRPr lang="zh-CN" altLang="en-US"/>
           </a:p>
@@ -7195,7 +7195,7 @@
           <a:p>
             <a:fld id="{1F6AFFF1-73BC-474B-9B74-714E66F6B952}" type="datetimeFigureOut">
               <a:rPr lang="zh-CN" altLang="en-US" smtClean="0"/>
-              <a:t>2021/5/8</a:t>
+              <a:t>2021/5/10</a:t>
             </a:fld>
             <a:endParaRPr lang="zh-CN" altLang="en-US"/>
           </a:p>
@@ -7506,7 +7506,7 @@
           <a:p>
             <a:fld id="{1F6AFFF1-73BC-474B-9B74-714E66F6B952}" type="datetimeFigureOut">
               <a:rPr lang="zh-CN" altLang="en-US" smtClean="0"/>
-              <a:t>2021/5/8</a:t>
+              <a:t>2021/5/10</a:t>
             </a:fld>
             <a:endParaRPr lang="zh-CN" altLang="en-US"/>
           </a:p>
@@ -7798,7 +7798,7 @@
           <a:p>
             <a:fld id="{1F6AFFF1-73BC-474B-9B74-714E66F6B952}" type="datetimeFigureOut">
               <a:rPr lang="zh-CN" altLang="en-US" smtClean="0"/>
-              <a:t>2021/5/8</a:t>
+              <a:t>2021/5/10</a:t>
             </a:fld>
             <a:endParaRPr lang="zh-CN" altLang="en-US"/>
           </a:p>
@@ -8163,7 +8163,7 @@
           <a:p>
             <a:fld id="{1F6AFFF1-73BC-474B-9B74-714E66F6B952}" type="datetimeFigureOut">
               <a:rPr lang="zh-CN" altLang="en-US" smtClean="0"/>
-              <a:t>2021/5/8</a:t>
+              <a:t>2021/5/10</a:t>
             </a:fld>
             <a:endParaRPr lang="zh-CN" altLang="en-US"/>
           </a:p>

</xml_diff>